<commit_message>
Analysis report, recommendations & next steps
</commit_message>
<xml_diff>
--- a/FundraisingAnalysis.pptx
+++ b/FundraisingAnalysis.pptx
@@ -222,7 +222,7 @@
           <a:p>
             <a:fld id="{0C706089-623C-3F48-B33D-00DC67619516}" type="datetimeFigureOut">
               <a:rPr lang="en-GB" smtClean="0"/>
-              <a:t>12/10/2025</a:t>
+              <a:t>13/10/2025</a:t>
             </a:fld>
             <a:endParaRPr lang="en-GB"/>
           </a:p>
@@ -6690,7 +6690,7 @@
         </p:blipFill>
         <p:spPr>
           <a:xfrm>
-            <a:off x="270210" y="1944899"/>
+            <a:off x="270210" y="1649438"/>
             <a:ext cx="6595047" cy="4803438"/>
           </a:xfrm>
           <a:prstGeom prst="rect">
@@ -6712,7 +6712,7 @@
         </p:nvSpPr>
         <p:spPr>
           <a:xfrm>
-            <a:off x="410514" y="1575567"/>
+            <a:off x="410514" y="1280106"/>
             <a:ext cx="4272196" cy="369332"/>
           </a:xfrm>
           <a:prstGeom prst="rect">
@@ -6807,7 +6807,7 @@
         </p:nvSpPr>
         <p:spPr>
           <a:xfrm>
-            <a:off x="6178248" y="5561043"/>
+            <a:off x="-512273" y="6545209"/>
             <a:ext cx="6117770" cy="276999"/>
           </a:xfrm>
           <a:prstGeom prst="rect">
@@ -6825,7 +6825,7 @@
             <a:r>
               <a:rPr lang="en-GB" sz="1200" i="1" dirty="0">
                 <a:solidFill>
-                  <a:schemeClr val="tx2"/>
+                  <a:srgbClr val="FF6464"/>
                 </a:solidFill>
                 <a:effectLst/>
                 <a:latin typeface="Calibri" panose="020F0502020204030204" pitchFamily="34" charset="0"/>
@@ -8618,7 +8618,7 @@
             <a:r>
               <a:rPr lang="en-GB" sz="1400" b="1" dirty="0">
                 <a:solidFill>
-                  <a:srgbClr val="0070C0"/>
+                  <a:schemeClr val="tx2"/>
                 </a:solidFill>
                 <a:latin typeface="Calibri" panose="020F0502020204030204" pitchFamily="34" charset="0"/>
                 <a:cs typeface="Calibri" panose="020F0502020204030204" pitchFamily="34" charset="0"/>
@@ -8649,7 +8649,7 @@
             <a:r>
               <a:rPr lang="en-GB" sz="1400" b="1" dirty="0">
                 <a:solidFill>
-                  <a:srgbClr val="0070C0"/>
+                  <a:schemeClr val="tx2"/>
                 </a:solidFill>
                 <a:latin typeface="Calibri" panose="020F0502020204030204" pitchFamily="34" charset="0"/>
                 <a:cs typeface="Calibri" panose="020F0502020204030204" pitchFamily="34" charset="0"/>
@@ -8659,22 +8659,12 @@
             <a:r>
               <a:rPr lang="en-GB" sz="1400" dirty="0">
                 <a:solidFill>
-                  <a:srgbClr val="0070C0"/>
-                </a:solidFill>
-                <a:latin typeface="Calibri" panose="020F0502020204030204" pitchFamily="34" charset="0"/>
-                <a:cs typeface="Calibri" panose="020F0502020204030204" pitchFamily="34" charset="0"/>
-              </a:rPr>
-              <a:t> </a:t>
-            </a:r>
-            <a:r>
-              <a:rPr lang="en-GB" sz="1400" dirty="0">
-                <a:solidFill>
                   <a:schemeClr val="tx2"/>
                 </a:solidFill>
                 <a:latin typeface="Calibri" panose="020F0502020204030204" pitchFamily="34" charset="0"/>
                 <a:cs typeface="Calibri" panose="020F0502020204030204" pitchFamily="34" charset="0"/>
               </a:rPr>
-              <a:t>Prioritise </a:t>
+              <a:t> Prioritise </a:t>
             </a:r>
             <a:r>
               <a:rPr lang="en-GB" sz="1400" b="1" dirty="0">
@@ -8728,7 +8718,7 @@
             <a:r>
               <a:rPr lang="en-GB" sz="1400" b="1" dirty="0">
                 <a:solidFill>
-                  <a:srgbClr val="0070C0"/>
+                  <a:schemeClr val="tx2"/>
                 </a:solidFill>
                 <a:latin typeface="Calibri" panose="020F0502020204030204" pitchFamily="34" charset="0"/>
                 <a:cs typeface="Calibri" panose="020F0502020204030204" pitchFamily="34" charset="0"/>
@@ -8738,22 +8728,12 @@
             <a:r>
               <a:rPr lang="en-GB" sz="1400" dirty="0">
                 <a:solidFill>
-                  <a:srgbClr val="0070C0"/>
-                </a:solidFill>
-                <a:latin typeface="Calibri" panose="020F0502020204030204" pitchFamily="34" charset="0"/>
-                <a:cs typeface="Calibri" panose="020F0502020204030204" pitchFamily="34" charset="0"/>
-              </a:rPr>
-              <a:t> </a:t>
-            </a:r>
-            <a:r>
-              <a:rPr lang="en-GB" sz="1400" dirty="0">
-                <a:solidFill>
                   <a:schemeClr val="tx2"/>
                 </a:solidFill>
                 <a:latin typeface="Calibri" panose="020F0502020204030204" pitchFamily="34" charset="0"/>
                 <a:cs typeface="Calibri" panose="020F0502020204030204" pitchFamily="34" charset="0"/>
               </a:rPr>
-              <a:t>Scale only with </a:t>
+              <a:t> Scale only with </a:t>
             </a:r>
             <a:r>
               <a:rPr lang="en-GB" sz="1400" b="1" dirty="0">
@@ -8930,7 +8910,7 @@
             <a:r>
               <a:rPr lang="en-GB" sz="1400" b="1" dirty="0">
                 <a:solidFill>
-                  <a:srgbClr val="00B050"/>
+                  <a:schemeClr val="tx2"/>
                 </a:solidFill>
                 <a:latin typeface="Calibri" panose="020F0502020204030204" pitchFamily="34" charset="0"/>
                 <a:cs typeface="Calibri" panose="020F0502020204030204" pitchFamily="34" charset="0"/>
@@ -8940,22 +8920,12 @@
             <a:r>
               <a:rPr lang="en-GB" sz="1400" dirty="0">
                 <a:solidFill>
-                  <a:srgbClr val="00B050"/>
-                </a:solidFill>
-                <a:latin typeface="Calibri" panose="020F0502020204030204" pitchFamily="34" charset="0"/>
-                <a:cs typeface="Calibri" panose="020F0502020204030204" pitchFamily="34" charset="0"/>
-              </a:rPr>
-              <a:t> </a:t>
-            </a:r>
-            <a:r>
-              <a:rPr lang="en-GB" sz="1400" dirty="0">
-                <a:solidFill>
                   <a:schemeClr val="tx2"/>
                 </a:solidFill>
                 <a:latin typeface="Calibri" panose="020F0502020204030204" pitchFamily="34" charset="0"/>
                 <a:cs typeface="Calibri" panose="020F0502020204030204" pitchFamily="34" charset="0"/>
               </a:rPr>
-              <a:t>≥95% matched, ≤3% fuzzy-under-review, ≤2% unmatched.</a:t>
+              <a:t> ≥95% matched, ≤3% fuzzy-under-review, ≤2% unmatched.</a:t>
             </a:r>
             <a:endParaRPr lang="en-GB" sz="1600" dirty="0">
               <a:solidFill>
@@ -9040,7 +9010,7 @@
             <a:r>
               <a:rPr lang="en-GB" sz="1400" b="1" dirty="0">
                 <a:solidFill>
-                  <a:srgbClr val="FF6464"/>
+                  <a:schemeClr val="tx2"/>
                 </a:solidFill>
                 <a:latin typeface="Calibri" panose="020F0502020204030204" pitchFamily="34" charset="0"/>
                 <a:cs typeface="Calibri" panose="020F0502020204030204" pitchFamily="34" charset="0"/>
@@ -9050,22 +9020,12 @@
             <a:r>
               <a:rPr lang="en-GB" sz="1400" dirty="0">
                 <a:solidFill>
-                  <a:srgbClr val="FF6464"/>
-                </a:solidFill>
-                <a:latin typeface="Calibri" panose="020F0502020204030204" pitchFamily="34" charset="0"/>
-                <a:cs typeface="Calibri" panose="020F0502020204030204" pitchFamily="34" charset="0"/>
-              </a:rPr>
-              <a:t> </a:t>
-            </a:r>
-            <a:r>
-              <a:rPr lang="en-GB" sz="1400" dirty="0">
-                <a:solidFill>
                   <a:schemeClr val="tx2"/>
                 </a:solidFill>
                 <a:latin typeface="Calibri" panose="020F0502020204030204" pitchFamily="34" charset="0"/>
                 <a:cs typeface="Calibri" panose="020F0502020204030204" pitchFamily="34" charset="0"/>
               </a:rPr>
-              <a:t>Scale only if tests beat control (e.g., p&lt;0.1).</a:t>
+              <a:t> Scale only if tests beat control (e.g., p&lt;0.1).</a:t>
             </a:r>
           </a:p>
           <a:p>
@@ -9540,7 +9500,7 @@
         </p:nvGrpSpPr>
         <p:grpSpPr>
           <a:xfrm>
-            <a:off x="403484" y="2197774"/>
+            <a:off x="494050" y="2197772"/>
             <a:ext cx="10942819" cy="3753638"/>
             <a:chOff x="538395" y="1982132"/>
             <a:chExt cx="10942819" cy="3753638"/>
@@ -9747,8 +9707,9 @@
               <a:avLst/>
             </a:prstGeom>
             <a:solidFill>
-              <a:schemeClr val="bg1">
-                <a:lumMod val="95000"/>
+              <a:schemeClr val="tx2">
+                <a:lumMod val="10000"/>
+                <a:lumOff val="90000"/>
               </a:schemeClr>
             </a:solidFill>
             <a:ln>
@@ -9787,7 +9748,7 @@
               <a:r>
                 <a:rPr lang="en-GB" sz="1600" b="1" dirty="0">
                   <a:solidFill>
-                    <a:srgbClr val="0070C0"/>
+                    <a:schemeClr val="tx2"/>
                   </a:solidFill>
                   <a:latin typeface="Calibri" panose="020F0502020204030204" pitchFamily="34" charset="0"/>
                   <a:cs typeface="Calibri" panose="020F0502020204030204" pitchFamily="34" charset="0"/>
@@ -9819,7 +9780,7 @@
               <a:r>
                 <a:rPr lang="en-GB" sz="1600" b="1" dirty="0">
                   <a:solidFill>
-                    <a:srgbClr val="FF6464"/>
+                    <a:schemeClr val="tx2"/>
                   </a:solidFill>
                   <a:latin typeface="Calibri" panose="020F0502020204030204" pitchFamily="34" charset="0"/>
                   <a:cs typeface="Calibri" panose="020F0502020204030204" pitchFamily="34" charset="0"/>
@@ -9851,7 +9812,7 @@
               <a:r>
                 <a:rPr lang="en-GB" sz="1600" b="1" dirty="0">
                   <a:solidFill>
-                    <a:srgbClr val="00B050"/>
+                    <a:schemeClr val="tx2"/>
                   </a:solidFill>
                   <a:latin typeface="Calibri" panose="020F0502020204030204" pitchFamily="34" charset="0"/>
                   <a:cs typeface="Calibri" panose="020F0502020204030204" pitchFamily="34" charset="0"/>
@@ -9901,8 +9862,9 @@
               <a:avLst/>
             </a:prstGeom>
             <a:solidFill>
-              <a:schemeClr val="bg1">
-                <a:lumMod val="95000"/>
+              <a:schemeClr val="accent3">
+                <a:lumMod val="20000"/>
+                <a:lumOff val="80000"/>
               </a:schemeClr>
             </a:solidFill>
             <a:ln>
@@ -10041,9 +10003,7 @@
               <a:avLst/>
             </a:prstGeom>
             <a:solidFill>
-              <a:schemeClr val="bg1">
-                <a:lumMod val="95000"/>
-              </a:schemeClr>
+              <a:srgbClr val="F0C7C1"/>
             </a:solidFill>
             <a:ln>
               <a:noFill/>

</xml_diff>